<commit_message>
Updated performance report and impact analisys
</commit_message>
<xml_diff>
--- a/Documentation/Performance report.pptx
+++ b/Documentation/Performance report.pptx
@@ -107,6 +107,11 @@
       </a:defRPr>
     </a:lvl9pPr>
   </p:defaultTextStyle>
+  <p:extLst>
+    <p:ext uri="{EFAFB233-063F-42B5-8137-9DF3F51BA10A}">
+      <p15:sldGuideLst xmlns:p15="http://schemas.microsoft.com/office/powerpoint/2012/main"/>
+    </p:ext>
+  </p:extLst>
 </p:presentation>
 </file>
 
@@ -198,7 +203,17 @@
     </c:title>
     <c:autoTitleDeleted val="0"/>
     <c:plotArea>
-      <c:layout/>
+      <c:layout>
+        <c:manualLayout>
+          <c:layoutTarget val="inner"/>
+          <c:xMode val="edge"/>
+          <c:yMode val="edge"/>
+          <c:x val="9.082376586634E-2"/>
+          <c:y val="9.383211775146913E-2"/>
+          <c:w val="0.89044896237827509"/>
+          <c:h val="0.76748654235442038"/>
+        </c:manualLayout>
+      </c:layout>
       <c:barChart>
         <c:barDir val="col"/>
         <c:grouping val="clustered"/>
@@ -229,29 +244,35 @@
           <c:invertIfNegative val="0"/>
           <c:cat>
             <c:strRef>
-              <c:f>Foglio1!$A$2:$A$3</c:f>
+              <c:f>Foglio1!$A$2:$A$4</c:f>
               <c:strCache>
-                <c:ptCount val="2"/>
+                <c:ptCount val="3"/>
                 <c:pt idx="0">
-                  <c:v>Cifratura I/O Sync</c:v>
+                  <c:v>SecureD I/O Sync</c:v>
                 </c:pt>
                 <c:pt idx="1">
-                  <c:v>Cifratura I/O Async</c:v>
+                  <c:v>SecureD I/O Async</c:v>
+                </c:pt>
+                <c:pt idx="2">
+                  <c:v>Secure I/O Async</c:v>
                 </c:pt>
               </c:strCache>
             </c:strRef>
           </c:cat>
           <c:val>
             <c:numRef>
-              <c:f>Foglio1!$B$2:$B$3</c:f>
+              <c:f>Foglio1!$B$2:$B$4</c:f>
               <c:numCache>
                 <c:formatCode>General</c:formatCode>
-                <c:ptCount val="2"/>
+                <c:ptCount val="3"/>
                 <c:pt idx="0">
-                  <c:v>38</c:v>
+                  <c:v>10</c:v>
                 </c:pt>
                 <c:pt idx="1">
-                  <c:v>93</c:v>
+                  <c:v>155</c:v>
+                </c:pt>
+                <c:pt idx="2">
+                  <c:v>45</c:v>
                 </c:pt>
               </c:numCache>
             </c:numRef>
@@ -288,29 +309,35 @@
           <c:invertIfNegative val="0"/>
           <c:cat>
             <c:strRef>
-              <c:f>Foglio1!$A$2:$A$3</c:f>
+              <c:f>Foglio1!$A$2:$A$4</c:f>
               <c:strCache>
-                <c:ptCount val="2"/>
+                <c:ptCount val="3"/>
                 <c:pt idx="0">
-                  <c:v>Cifratura I/O Sync</c:v>
+                  <c:v>SecureD I/O Sync</c:v>
                 </c:pt>
                 <c:pt idx="1">
-                  <c:v>Cifratura I/O Async</c:v>
+                  <c:v>SecureD I/O Async</c:v>
+                </c:pt>
+                <c:pt idx="2">
+                  <c:v>Secure I/O Async</c:v>
                 </c:pt>
               </c:strCache>
             </c:strRef>
           </c:cat>
           <c:val>
             <c:numRef>
-              <c:f>Foglio1!$C$2:$C$3</c:f>
+              <c:f>Foglio1!$C$2:$C$4</c:f>
               <c:numCache>
                 <c:formatCode>General</c:formatCode>
-                <c:ptCount val="2"/>
+                <c:ptCount val="3"/>
                 <c:pt idx="0">
-                  <c:v>105</c:v>
+                  <c:v>31</c:v>
                 </c:pt>
                 <c:pt idx="1">
-                  <c:v>347</c:v>
+                  <c:v>291</c:v>
+                </c:pt>
+                <c:pt idx="2">
+                  <c:v>80</c:v>
                 </c:pt>
               </c:numCache>
             </c:numRef>
@@ -7276,13 +7303,13 @@
           <p:nvPr>
             <p:extLst>
               <p:ext uri="{D42A27DB-BD31-4B8C-83A1-F6EECF244321}">
-                <p14:modId xmlns:p14="http://schemas.microsoft.com/office/powerpoint/2010/main" val="1896783531"/>
+                <p14:modId xmlns:p14="http://schemas.microsoft.com/office/powerpoint/2010/main" val="2006052249"/>
               </p:ext>
             </p:extLst>
           </p:nvPr>
         </p:nvGraphicFramePr>
         <p:xfrm>
-          <a:off x="2032000" y="719666"/>
+          <a:off x="1356139" y="719666"/>
           <a:ext cx="5425243" cy="5418667"/>
         </p:xfrm>
         <a:graphic>
@@ -7305,8 +7332,8 @@
         </p:nvSpPr>
         <p:spPr>
           <a:xfrm>
-            <a:off x="7661429" y="1597981"/>
-            <a:ext cx="3923930" cy="3416320"/>
+            <a:off x="7195930" y="1597981"/>
+            <a:ext cx="4389429" cy="4524315"/>
           </a:xfrm>
           <a:prstGeom prst="rect">
             <a:avLst/>
@@ -7353,8 +7380,12 @@
               <a:t>Il miglioramento prestazionale garantito da </a:t>
             </a:r>
             <a:r>
+              <a:rPr lang="it-IT" dirty="0" err="1"/>
+              <a:t>S</a:t>
+            </a:r>
+            <a:r>
               <a:rPr lang="it-IT" sz="1800" dirty="0" err="1"/>
-              <a:t>secureD</a:t>
+              <a:t>ecureD</a:t>
             </a:r>
             <a:r>
               <a:rPr lang="it-IT" sz="1800" dirty="0"/>
@@ -7375,8 +7406,22 @@
             </a:r>
             <a:r>
               <a:rPr lang="it-IT" sz="1800" dirty="0"/>
-              <a:t> derivanti da modalità di risparmio energetico</a:t>
-            </a:r>
+              <a:t> derivanti da modalità di risparmio energetico.</a:t>
+            </a:r>
+          </a:p>
+          <a:p>
+            <a:endParaRPr lang="it-IT" dirty="0"/>
+          </a:p>
+          <a:p>
+            <a:r>
+              <a:rPr lang="it-IT" sz="1800" dirty="0"/>
+              <a:t>Eventuali problemi di inconsistenza possono palesarsi a causa di memorie di massa </a:t>
+            </a:r>
+            <a:r>
+              <a:rPr lang="it-IT" sz="1800"/>
+              <a:t>eccessivamente lente.</a:t>
+            </a:r>
+            <a:endParaRPr lang="it-IT" sz="1800" dirty="0"/>
           </a:p>
         </p:txBody>
       </p:sp>

</xml_diff>